<commit_message>
add 2 part of pres bout unity
</commit_message>
<xml_diff>
--- a/2020_GameDev-As-Hobby/Presentation.pptx
+++ b/2020_GameDev-As-Hobby/Presentation.pptx
@@ -4,6 +4,9 @@
   <p:sldMasterIdLst>
     <p:sldMasterId id="2147483660" r:id="rId1"/>
   </p:sldMasterIdLst>
+  <p:notesMasterIdLst>
+    <p:notesMasterId r:id="rId23"/>
+  </p:notesMasterIdLst>
   <p:sldIdLst>
     <p:sldId id="256" r:id="rId2"/>
     <p:sldId id="257" r:id="rId3"/>
@@ -17,7 +20,15 @@
     <p:sldId id="266" r:id="rId11"/>
     <p:sldId id="267" r:id="rId12"/>
     <p:sldId id="268" r:id="rId13"/>
-    <p:sldId id="269" r:id="rId14"/>
+    <p:sldId id="270" r:id="rId14"/>
+    <p:sldId id="273" r:id="rId15"/>
+    <p:sldId id="269" r:id="rId16"/>
+    <p:sldId id="275" r:id="rId17"/>
+    <p:sldId id="271" r:id="rId18"/>
+    <p:sldId id="272" r:id="rId19"/>
+    <p:sldId id="274" r:id="rId20"/>
+    <p:sldId id="276" r:id="rId21"/>
+    <p:sldId id="277" r:id="rId22"/>
   </p:sldIdLst>
   <p:sldSz cx="12192000" cy="6858000"/>
   <p:notesSz cx="6858000" cy="9144000"/>
@@ -137,11 +148,20 @@
             <p14:sldId id="266"/>
             <p14:sldId id="267"/>
             <p14:sldId id="268"/>
-            <p14:sldId id="269"/>
           </p14:sldIdLst>
         </p14:section>
-        <p14:section name="Организация" id="{5A5F877F-8973-49DD-B089-DE6FF1E5BB43}">
-          <p14:sldIdLst/>
+        <p14:section name="Как организовать свое хобби" id="{5A5F877F-8973-49DD-B089-DE6FF1E5BB43}">
+          <p14:sldIdLst>
+            <p14:sldId id="270"/>
+            <p14:sldId id="273"/>
+            <p14:sldId id="269"/>
+            <p14:sldId id="275"/>
+            <p14:sldId id="271"/>
+            <p14:sldId id="272"/>
+            <p14:sldId id="274"/>
+            <p14:sldId id="276"/>
+            <p14:sldId id="277"/>
+          </p14:sldIdLst>
         </p14:section>
         <p14:section name="10 min challenge" id="{0B26F2E1-CA21-4A39-B035-AE08637FCAC8}">
           <p14:sldIdLst/>
@@ -154,8 +174,444 @@
         </p14:section>
       </p14:sectionLst>
     </p:ext>
+    <p:ext uri="{EFAFB233-063F-42B5-8137-9DF3F51BA10A}">
+      <p15:sldGuideLst xmlns:p15="http://schemas.microsoft.com/office/powerpoint/2012/main"/>
+    </p:ext>
   </p:extLst>
 </p:presentation>
+</file>
+
+<file path=ppt/notesMasters/notesMaster1.xml><?xml version="1.0" encoding="utf-8"?>
+<p:notesMaster xmlns:a="http://schemas.openxmlformats.org/drawingml/2006/main" xmlns:r="http://schemas.openxmlformats.org/officeDocument/2006/relationships" xmlns:p="http://schemas.openxmlformats.org/presentationml/2006/main">
+  <p:cSld>
+    <p:bg>
+      <p:bgRef idx="1001">
+        <a:schemeClr val="bg1"/>
+      </p:bgRef>
+    </p:bg>
+    <p:spTree>
+      <p:nvGrpSpPr>
+        <p:cNvPr id="1" name=""/>
+        <p:cNvGrpSpPr/>
+        <p:nvPr/>
+      </p:nvGrpSpPr>
+      <p:grpSpPr>
+        <a:xfrm>
+          <a:off x="0" y="0"/>
+          <a:ext cx="0" cy="0"/>
+          <a:chOff x="0" y="0"/>
+          <a:chExt cx="0" cy="0"/>
+        </a:xfrm>
+      </p:grpSpPr>
+      <p:sp>
+        <p:nvSpPr>
+          <p:cNvPr id="2" name="Header Placeholder 1"/>
+          <p:cNvSpPr>
+            <a:spLocks noGrp="1"/>
+          </p:cNvSpPr>
+          <p:nvPr>
+            <p:ph type="hdr" sz="quarter"/>
+          </p:nvPr>
+        </p:nvSpPr>
+        <p:spPr>
+          <a:xfrm>
+            <a:off x="0" y="0"/>
+            <a:ext cx="2971800" cy="458788"/>
+          </a:xfrm>
+          <a:prstGeom prst="rect">
+            <a:avLst/>
+          </a:prstGeom>
+        </p:spPr>
+        <p:txBody>
+          <a:bodyPr vert="horz" lIns="91440" tIns="45720" rIns="91440" bIns="45720" rtlCol="0"/>
+          <a:lstStyle>
+            <a:lvl1pPr algn="l">
+              <a:defRPr sz="1200"/>
+            </a:lvl1pPr>
+          </a:lstStyle>
+          <a:p>
+            <a:endParaRPr lang="en-US"/>
+          </a:p>
+        </p:txBody>
+      </p:sp>
+      <p:sp>
+        <p:nvSpPr>
+          <p:cNvPr id="3" name="Date Placeholder 2"/>
+          <p:cNvSpPr>
+            <a:spLocks noGrp="1"/>
+          </p:cNvSpPr>
+          <p:nvPr>
+            <p:ph type="dt" idx="1"/>
+          </p:nvPr>
+        </p:nvSpPr>
+        <p:spPr>
+          <a:xfrm>
+            <a:off x="3884613" y="0"/>
+            <a:ext cx="2971800" cy="458788"/>
+          </a:xfrm>
+          <a:prstGeom prst="rect">
+            <a:avLst/>
+          </a:prstGeom>
+        </p:spPr>
+        <p:txBody>
+          <a:bodyPr vert="horz" lIns="91440" tIns="45720" rIns="91440" bIns="45720" rtlCol="0"/>
+          <a:lstStyle>
+            <a:lvl1pPr algn="r">
+              <a:defRPr sz="1200"/>
+            </a:lvl1pPr>
+          </a:lstStyle>
+          <a:p>
+            <a:fld id="{4DACE59F-CEFB-4400-BB2C-C07F77BD6D4D}" type="datetimeFigureOut">
+              <a:rPr lang="en-US" smtClean="0"/>
+              <a:t>2020-04-23</a:t>
+            </a:fld>
+            <a:endParaRPr lang="en-US"/>
+          </a:p>
+        </p:txBody>
+      </p:sp>
+      <p:sp>
+        <p:nvSpPr>
+          <p:cNvPr id="4" name="Slide Image Placeholder 3"/>
+          <p:cNvSpPr>
+            <a:spLocks noGrp="1" noRot="1" noChangeAspect="1"/>
+          </p:cNvSpPr>
+          <p:nvPr>
+            <p:ph type="sldImg" idx="2"/>
+          </p:nvPr>
+        </p:nvSpPr>
+        <p:spPr>
+          <a:xfrm>
+            <a:off x="685800" y="1143000"/>
+            <a:ext cx="5486400" cy="3086100"/>
+          </a:xfrm>
+          <a:prstGeom prst="rect">
+            <a:avLst/>
+          </a:prstGeom>
+          <a:noFill/>
+          <a:ln w="12700">
+            <a:solidFill>
+              <a:prstClr val="black"/>
+            </a:solidFill>
+          </a:ln>
+        </p:spPr>
+        <p:txBody>
+          <a:bodyPr vert="horz" lIns="91440" tIns="45720" rIns="91440" bIns="45720" rtlCol="0" anchor="ctr"/>
+          <a:lstStyle/>
+          <a:p>
+            <a:endParaRPr lang="en-US"/>
+          </a:p>
+        </p:txBody>
+      </p:sp>
+      <p:sp>
+        <p:nvSpPr>
+          <p:cNvPr id="5" name="Notes Placeholder 4"/>
+          <p:cNvSpPr>
+            <a:spLocks noGrp="1"/>
+          </p:cNvSpPr>
+          <p:nvPr>
+            <p:ph type="body" sz="quarter" idx="3"/>
+          </p:nvPr>
+        </p:nvSpPr>
+        <p:spPr>
+          <a:xfrm>
+            <a:off x="685800" y="4400550"/>
+            <a:ext cx="5486400" cy="3600450"/>
+          </a:xfrm>
+          <a:prstGeom prst="rect">
+            <a:avLst/>
+          </a:prstGeom>
+        </p:spPr>
+        <p:txBody>
+          <a:bodyPr vert="horz" lIns="91440" tIns="45720" rIns="91440" bIns="45720" rtlCol="0"/>
+          <a:lstStyle/>
+          <a:p>
+            <a:pPr lvl="0"/>
+            <a:r>
+              <a:rPr lang="en-US"/>
+              <a:t>Click to edit Master text styles</a:t>
+            </a:r>
+          </a:p>
+          <a:p>
+            <a:pPr lvl="1"/>
+            <a:r>
+              <a:rPr lang="en-US"/>
+              <a:t>Second level</a:t>
+            </a:r>
+          </a:p>
+          <a:p>
+            <a:pPr lvl="2"/>
+            <a:r>
+              <a:rPr lang="en-US"/>
+              <a:t>Third level</a:t>
+            </a:r>
+          </a:p>
+          <a:p>
+            <a:pPr lvl="3"/>
+            <a:r>
+              <a:rPr lang="en-US"/>
+              <a:t>Fourth level</a:t>
+            </a:r>
+          </a:p>
+          <a:p>
+            <a:pPr lvl="4"/>
+            <a:r>
+              <a:rPr lang="en-US"/>
+              <a:t>Fifth level</a:t>
+            </a:r>
+          </a:p>
+        </p:txBody>
+      </p:sp>
+      <p:sp>
+        <p:nvSpPr>
+          <p:cNvPr id="6" name="Footer Placeholder 5"/>
+          <p:cNvSpPr>
+            <a:spLocks noGrp="1"/>
+          </p:cNvSpPr>
+          <p:nvPr>
+            <p:ph type="ftr" sz="quarter" idx="4"/>
+          </p:nvPr>
+        </p:nvSpPr>
+        <p:spPr>
+          <a:xfrm>
+            <a:off x="0" y="8685213"/>
+            <a:ext cx="2971800" cy="458787"/>
+          </a:xfrm>
+          <a:prstGeom prst="rect">
+            <a:avLst/>
+          </a:prstGeom>
+        </p:spPr>
+        <p:txBody>
+          <a:bodyPr vert="horz" lIns="91440" tIns="45720" rIns="91440" bIns="45720" rtlCol="0" anchor="b"/>
+          <a:lstStyle>
+            <a:lvl1pPr algn="l">
+              <a:defRPr sz="1200"/>
+            </a:lvl1pPr>
+          </a:lstStyle>
+          <a:p>
+            <a:endParaRPr lang="en-US"/>
+          </a:p>
+        </p:txBody>
+      </p:sp>
+      <p:sp>
+        <p:nvSpPr>
+          <p:cNvPr id="7" name="Slide Number Placeholder 6"/>
+          <p:cNvSpPr>
+            <a:spLocks noGrp="1"/>
+          </p:cNvSpPr>
+          <p:nvPr>
+            <p:ph type="sldNum" sz="quarter" idx="5"/>
+          </p:nvPr>
+        </p:nvSpPr>
+        <p:spPr>
+          <a:xfrm>
+            <a:off x="3884613" y="8685213"/>
+            <a:ext cx="2971800" cy="458787"/>
+          </a:xfrm>
+          <a:prstGeom prst="rect">
+            <a:avLst/>
+          </a:prstGeom>
+        </p:spPr>
+        <p:txBody>
+          <a:bodyPr vert="horz" lIns="91440" tIns="45720" rIns="91440" bIns="45720" rtlCol="0" anchor="b"/>
+          <a:lstStyle>
+            <a:lvl1pPr algn="r">
+              <a:defRPr sz="1200"/>
+            </a:lvl1pPr>
+          </a:lstStyle>
+          <a:p>
+            <a:fld id="{CE2E81DB-CD53-4B87-928A-DCF354D5A16C}" type="slidenum">
+              <a:rPr lang="en-US" smtClean="0"/>
+              <a:t>‹#›</a:t>
+            </a:fld>
+            <a:endParaRPr lang="en-US"/>
+          </a:p>
+        </p:txBody>
+      </p:sp>
+    </p:spTree>
+    <p:extLst>
+      <p:ext uri="{BB962C8B-B14F-4D97-AF65-F5344CB8AC3E}">
+        <p14:creationId xmlns:p14="http://schemas.microsoft.com/office/powerpoint/2010/main" val="2356985994"/>
+      </p:ext>
+    </p:extLst>
+  </p:cSld>
+  <p:clrMap bg1="lt1" tx1="dk1" bg2="lt2" tx2="dk2" accent1="accent1" accent2="accent2" accent3="accent3" accent4="accent4" accent5="accent5" accent6="accent6" hlink="hlink" folHlink="folHlink"/>
+  <p:notesStyle>
+    <a:lvl1pPr marL="0" algn="l" defTabSz="914400" rtl="0" eaLnBrk="1" latinLnBrk="0" hangingPunct="1">
+      <a:defRPr sz="1200" kern="1200">
+        <a:solidFill>
+          <a:schemeClr val="tx1"/>
+        </a:solidFill>
+        <a:latin typeface="+mn-lt"/>
+        <a:ea typeface="+mn-ea"/>
+        <a:cs typeface="+mn-cs"/>
+      </a:defRPr>
+    </a:lvl1pPr>
+    <a:lvl2pPr marL="457200" algn="l" defTabSz="914400" rtl="0" eaLnBrk="1" latinLnBrk="0" hangingPunct="1">
+      <a:defRPr sz="1200" kern="1200">
+        <a:solidFill>
+          <a:schemeClr val="tx1"/>
+        </a:solidFill>
+        <a:latin typeface="+mn-lt"/>
+        <a:ea typeface="+mn-ea"/>
+        <a:cs typeface="+mn-cs"/>
+      </a:defRPr>
+    </a:lvl2pPr>
+    <a:lvl3pPr marL="914400" algn="l" defTabSz="914400" rtl="0" eaLnBrk="1" latinLnBrk="0" hangingPunct="1">
+      <a:defRPr sz="1200" kern="1200">
+        <a:solidFill>
+          <a:schemeClr val="tx1"/>
+        </a:solidFill>
+        <a:latin typeface="+mn-lt"/>
+        <a:ea typeface="+mn-ea"/>
+        <a:cs typeface="+mn-cs"/>
+      </a:defRPr>
+    </a:lvl3pPr>
+    <a:lvl4pPr marL="1371600" algn="l" defTabSz="914400" rtl="0" eaLnBrk="1" latinLnBrk="0" hangingPunct="1">
+      <a:defRPr sz="1200" kern="1200">
+        <a:solidFill>
+          <a:schemeClr val="tx1"/>
+        </a:solidFill>
+        <a:latin typeface="+mn-lt"/>
+        <a:ea typeface="+mn-ea"/>
+        <a:cs typeface="+mn-cs"/>
+      </a:defRPr>
+    </a:lvl4pPr>
+    <a:lvl5pPr marL="1828800" algn="l" defTabSz="914400" rtl="0" eaLnBrk="1" latinLnBrk="0" hangingPunct="1">
+      <a:defRPr sz="1200" kern="1200">
+        <a:solidFill>
+          <a:schemeClr val="tx1"/>
+        </a:solidFill>
+        <a:latin typeface="+mn-lt"/>
+        <a:ea typeface="+mn-ea"/>
+        <a:cs typeface="+mn-cs"/>
+      </a:defRPr>
+    </a:lvl5pPr>
+    <a:lvl6pPr marL="2286000" algn="l" defTabSz="914400" rtl="0" eaLnBrk="1" latinLnBrk="0" hangingPunct="1">
+      <a:defRPr sz="1200" kern="1200">
+        <a:solidFill>
+          <a:schemeClr val="tx1"/>
+        </a:solidFill>
+        <a:latin typeface="+mn-lt"/>
+        <a:ea typeface="+mn-ea"/>
+        <a:cs typeface="+mn-cs"/>
+      </a:defRPr>
+    </a:lvl6pPr>
+    <a:lvl7pPr marL="2743200" algn="l" defTabSz="914400" rtl="0" eaLnBrk="1" latinLnBrk="0" hangingPunct="1">
+      <a:defRPr sz="1200" kern="1200">
+        <a:solidFill>
+          <a:schemeClr val="tx1"/>
+        </a:solidFill>
+        <a:latin typeface="+mn-lt"/>
+        <a:ea typeface="+mn-ea"/>
+        <a:cs typeface="+mn-cs"/>
+      </a:defRPr>
+    </a:lvl7pPr>
+    <a:lvl8pPr marL="3200400" algn="l" defTabSz="914400" rtl="0" eaLnBrk="1" latinLnBrk="0" hangingPunct="1">
+      <a:defRPr sz="1200" kern="1200">
+        <a:solidFill>
+          <a:schemeClr val="tx1"/>
+        </a:solidFill>
+        <a:latin typeface="+mn-lt"/>
+        <a:ea typeface="+mn-ea"/>
+        <a:cs typeface="+mn-cs"/>
+      </a:defRPr>
+    </a:lvl8pPr>
+    <a:lvl9pPr marL="3657600" algn="l" defTabSz="914400" rtl="0" eaLnBrk="1" latinLnBrk="0" hangingPunct="1">
+      <a:defRPr sz="1200" kern="1200">
+        <a:solidFill>
+          <a:schemeClr val="tx1"/>
+        </a:solidFill>
+        <a:latin typeface="+mn-lt"/>
+        <a:ea typeface="+mn-ea"/>
+        <a:cs typeface="+mn-cs"/>
+      </a:defRPr>
+    </a:lvl9pPr>
+  </p:notesStyle>
+</p:notesMaster>
+</file>
+
+<file path=ppt/notesSlides/notesSlide1.xml><?xml version="1.0" encoding="utf-8"?>
+<p:notes xmlns:a="http://schemas.openxmlformats.org/drawingml/2006/main" xmlns:r="http://schemas.openxmlformats.org/officeDocument/2006/relationships" xmlns:p="http://schemas.openxmlformats.org/presentationml/2006/main">
+  <p:cSld>
+    <p:spTree>
+      <p:nvGrpSpPr>
+        <p:cNvPr id="1" name=""/>
+        <p:cNvGrpSpPr/>
+        <p:nvPr/>
+      </p:nvGrpSpPr>
+      <p:grpSpPr>
+        <a:xfrm>
+          <a:off x="0" y="0"/>
+          <a:ext cx="0" cy="0"/>
+          <a:chOff x="0" y="0"/>
+          <a:chExt cx="0" cy="0"/>
+        </a:xfrm>
+      </p:grpSpPr>
+      <p:sp>
+        <p:nvSpPr>
+          <p:cNvPr id="2" name="Slide Image Placeholder 1"/>
+          <p:cNvSpPr>
+            <a:spLocks noGrp="1" noRot="1" noChangeAspect="1"/>
+          </p:cNvSpPr>
+          <p:nvPr>
+            <p:ph type="sldImg"/>
+          </p:nvPr>
+        </p:nvSpPr>
+        <p:spPr/>
+      </p:sp>
+      <p:sp>
+        <p:nvSpPr>
+          <p:cNvPr id="3" name="Notes Placeholder 2"/>
+          <p:cNvSpPr>
+            <a:spLocks noGrp="1"/>
+          </p:cNvSpPr>
+          <p:nvPr>
+            <p:ph type="body" idx="1"/>
+          </p:nvPr>
+        </p:nvSpPr>
+        <p:spPr/>
+        <p:txBody>
+          <a:bodyPr/>
+          <a:lstStyle/>
+          <a:p>
+            <a:endParaRPr lang="en-US" dirty="0"/>
+          </a:p>
+        </p:txBody>
+      </p:sp>
+      <p:sp>
+        <p:nvSpPr>
+          <p:cNvPr id="4" name="Slide Number Placeholder 3"/>
+          <p:cNvSpPr>
+            <a:spLocks noGrp="1"/>
+          </p:cNvSpPr>
+          <p:nvPr>
+            <p:ph type="sldNum" sz="quarter" idx="5"/>
+          </p:nvPr>
+        </p:nvSpPr>
+        <p:spPr/>
+        <p:txBody>
+          <a:bodyPr/>
+          <a:lstStyle/>
+          <a:p>
+            <a:fld id="{CE2E81DB-CD53-4B87-928A-DCF354D5A16C}" type="slidenum">
+              <a:rPr lang="en-US" smtClean="0"/>
+              <a:t>15</a:t>
+            </a:fld>
+            <a:endParaRPr lang="en-US"/>
+          </a:p>
+        </p:txBody>
+      </p:sp>
+    </p:spTree>
+    <p:extLst>
+      <p:ext uri="{BB962C8B-B14F-4D97-AF65-F5344CB8AC3E}">
+        <p14:creationId xmlns:p14="http://schemas.microsoft.com/office/powerpoint/2010/main" val="4111768511"/>
+      </p:ext>
+    </p:extLst>
+  </p:cSld>
+  <p:clrMapOvr>
+    <a:masterClrMapping/>
+  </p:clrMapOvr>
+</p:notes>
 </file>
 
 <file path=ppt/slideLayouts/slideLayout1.xml><?xml version="1.0" encoding="utf-8"?>
@@ -305,7 +761,7 @@
           <a:p>
             <a:fld id="{B7A19616-B823-490D-AAEB-978D4FB257C6}" type="datetimeFigureOut">
               <a:rPr lang="en-US" smtClean="0"/>
-              <a:t>2020-04-22</a:t>
+              <a:t>2020-04-23</a:t>
             </a:fld>
             <a:endParaRPr lang="en-US"/>
           </a:p>
@@ -503,7 +959,7 @@
           <a:p>
             <a:fld id="{B7A19616-B823-490D-AAEB-978D4FB257C6}" type="datetimeFigureOut">
               <a:rPr lang="en-US" smtClean="0"/>
-              <a:t>2020-04-22</a:t>
+              <a:t>2020-04-23</a:t>
             </a:fld>
             <a:endParaRPr lang="en-US"/>
           </a:p>
@@ -711,7 +1167,7 @@
           <a:p>
             <a:fld id="{B7A19616-B823-490D-AAEB-978D4FB257C6}" type="datetimeFigureOut">
               <a:rPr lang="en-US" smtClean="0"/>
-              <a:t>2020-04-22</a:t>
+              <a:t>2020-04-23</a:t>
             </a:fld>
             <a:endParaRPr lang="en-US"/>
           </a:p>
@@ -909,7 +1365,7 @@
           <a:p>
             <a:fld id="{B7A19616-B823-490D-AAEB-978D4FB257C6}" type="datetimeFigureOut">
               <a:rPr lang="en-US" smtClean="0"/>
-              <a:t>2020-04-22</a:t>
+              <a:t>2020-04-23</a:t>
             </a:fld>
             <a:endParaRPr lang="en-US"/>
           </a:p>
@@ -1184,7 +1640,7 @@
           <a:p>
             <a:fld id="{B7A19616-B823-490D-AAEB-978D4FB257C6}" type="datetimeFigureOut">
               <a:rPr lang="en-US" smtClean="0"/>
-              <a:t>2020-04-22</a:t>
+              <a:t>2020-04-23</a:t>
             </a:fld>
             <a:endParaRPr lang="en-US"/>
           </a:p>
@@ -1449,7 +1905,7 @@
           <a:p>
             <a:fld id="{B7A19616-B823-490D-AAEB-978D4FB257C6}" type="datetimeFigureOut">
               <a:rPr lang="en-US" smtClean="0"/>
-              <a:t>2020-04-22</a:t>
+              <a:t>2020-04-23</a:t>
             </a:fld>
             <a:endParaRPr lang="en-US"/>
           </a:p>
@@ -1861,7 +2317,7 @@
           <a:p>
             <a:fld id="{B7A19616-B823-490D-AAEB-978D4FB257C6}" type="datetimeFigureOut">
               <a:rPr lang="en-US" smtClean="0"/>
-              <a:t>2020-04-22</a:t>
+              <a:t>2020-04-23</a:t>
             </a:fld>
             <a:endParaRPr lang="en-US"/>
           </a:p>
@@ -2002,7 +2458,7 @@
           <a:p>
             <a:fld id="{B7A19616-B823-490D-AAEB-978D4FB257C6}" type="datetimeFigureOut">
               <a:rPr lang="en-US" smtClean="0"/>
-              <a:t>2020-04-22</a:t>
+              <a:t>2020-04-23</a:t>
             </a:fld>
             <a:endParaRPr lang="en-US"/>
           </a:p>
@@ -2115,7 +2571,7 @@
           <a:p>
             <a:fld id="{B7A19616-B823-490D-AAEB-978D4FB257C6}" type="datetimeFigureOut">
               <a:rPr lang="en-US" smtClean="0"/>
-              <a:t>2020-04-22</a:t>
+              <a:t>2020-04-23</a:t>
             </a:fld>
             <a:endParaRPr lang="en-US"/>
           </a:p>
@@ -2426,7 +2882,7 @@
           <a:p>
             <a:fld id="{B7A19616-B823-490D-AAEB-978D4FB257C6}" type="datetimeFigureOut">
               <a:rPr lang="en-US" smtClean="0"/>
-              <a:t>2020-04-22</a:t>
+              <a:t>2020-04-23</a:t>
             </a:fld>
             <a:endParaRPr lang="en-US"/>
           </a:p>
@@ -2717,7 +3173,7 @@
           <a:p>
             <a:fld id="{B7A19616-B823-490D-AAEB-978D4FB257C6}" type="datetimeFigureOut">
               <a:rPr lang="en-US" smtClean="0"/>
-              <a:t>2020-04-22</a:t>
+              <a:t>2020-04-23</a:t>
             </a:fld>
             <a:endParaRPr lang="en-US"/>
           </a:p>
@@ -2958,7 +3414,7 @@
           <a:p>
             <a:fld id="{B7A19616-B823-490D-AAEB-978D4FB257C6}" type="datetimeFigureOut">
               <a:rPr lang="en-US" smtClean="0"/>
-              <a:t>2020-04-22</a:t>
+              <a:t>2020-04-23</a:t>
             </a:fld>
             <a:endParaRPr lang="en-US"/>
           </a:p>
@@ -3843,6 +4299,230 @@
           <p:cNvPr id="2" name="Title 1">
             <a:extLst>
               <a:ext uri="{FF2B5EF4-FFF2-40B4-BE49-F238E27FC236}">
+                <a16:creationId xmlns:a16="http://schemas.microsoft.com/office/drawing/2014/main" id="{5A371613-2DD0-4248-B7E0-19B1BCCAD08E}"/>
+              </a:ext>
+            </a:extLst>
+          </p:cNvPr>
+          <p:cNvSpPr>
+            <a:spLocks noGrp="1"/>
+          </p:cNvSpPr>
+          <p:nvPr>
+            <p:ph type="title"/>
+          </p:nvPr>
+        </p:nvSpPr>
+        <p:spPr/>
+        <p:txBody>
+          <a:bodyPr/>
+          <a:lstStyle/>
+          <a:p>
+            <a:r>
+              <a:rPr lang="ru-RU" dirty="0"/>
+              <a:t>Хобби</a:t>
+            </a:r>
+            <a:endParaRPr lang="en-US" dirty="0"/>
+          </a:p>
+        </p:txBody>
+      </p:sp>
+      <p:sp>
+        <p:nvSpPr>
+          <p:cNvPr id="3" name="Content Placeholder 2">
+            <a:extLst>
+              <a:ext uri="{FF2B5EF4-FFF2-40B4-BE49-F238E27FC236}">
+                <a16:creationId xmlns:a16="http://schemas.microsoft.com/office/drawing/2014/main" id="{A1ED221B-D9F8-42BC-BFD8-704E5569CC45}"/>
+              </a:ext>
+            </a:extLst>
+          </p:cNvPr>
+          <p:cNvSpPr>
+            <a:spLocks noGrp="1"/>
+          </p:cNvSpPr>
+          <p:nvPr>
+            <p:ph idx="1"/>
+          </p:nvPr>
+        </p:nvSpPr>
+        <p:spPr/>
+        <p:txBody>
+          <a:bodyPr/>
+          <a:lstStyle/>
+          <a:p>
+            <a:r>
+              <a:rPr lang="en-US" dirty="0"/>
+              <a:t>TBD: </a:t>
+            </a:r>
+            <a:r>
+              <a:rPr lang="ru-RU" dirty="0"/>
+              <a:t>опредеоение</a:t>
+            </a:r>
+          </a:p>
+          <a:p>
+            <a:r>
+              <a:rPr lang="ru-RU" dirty="0"/>
+              <a:t>Сдлеать фокус на то, что катки в доту и прохождение очереного мыльного кинца на плойке – не хобби, а потребление</a:t>
+            </a:r>
+          </a:p>
+          <a:p>
+            <a:r>
+              <a:rPr lang="ru-RU" dirty="0"/>
+              <a:t>Человек – существо креативное, желание создавать это часть нашей природы</a:t>
+            </a:r>
+            <a:endParaRPr lang="en-US" dirty="0"/>
+          </a:p>
+        </p:txBody>
+      </p:sp>
+    </p:spTree>
+    <p:extLst>
+      <p:ext uri="{BB962C8B-B14F-4D97-AF65-F5344CB8AC3E}">
+        <p14:creationId xmlns:p14="http://schemas.microsoft.com/office/powerpoint/2010/main" val="1835030012"/>
+      </p:ext>
+    </p:extLst>
+  </p:cSld>
+  <p:clrMapOvr>
+    <a:masterClrMapping/>
+  </p:clrMapOvr>
+</p:sld>
+</file>
+
+<file path=ppt/slides/slide14.xml><?xml version="1.0" encoding="utf-8"?>
+<p:sld xmlns:a="http://schemas.openxmlformats.org/drawingml/2006/main" xmlns:r="http://schemas.openxmlformats.org/officeDocument/2006/relationships" xmlns:p="http://schemas.openxmlformats.org/presentationml/2006/main">
+  <p:cSld>
+    <p:spTree>
+      <p:nvGrpSpPr>
+        <p:cNvPr id="1" name=""/>
+        <p:cNvGrpSpPr/>
+        <p:nvPr/>
+      </p:nvGrpSpPr>
+      <p:grpSpPr>
+        <a:xfrm>
+          <a:off x="0" y="0"/>
+          <a:ext cx="0" cy="0"/>
+          <a:chOff x="0" y="0"/>
+          <a:chExt cx="0" cy="0"/>
+        </a:xfrm>
+      </p:grpSpPr>
+      <p:sp>
+        <p:nvSpPr>
+          <p:cNvPr id="2" name="Title 1">
+            <a:extLst>
+              <a:ext uri="{FF2B5EF4-FFF2-40B4-BE49-F238E27FC236}">
+                <a16:creationId xmlns:a16="http://schemas.microsoft.com/office/drawing/2014/main" id="{EBCB897E-838E-478E-AB80-5AC7331A7C58}"/>
+              </a:ext>
+            </a:extLst>
+          </p:cNvPr>
+          <p:cNvSpPr>
+            <a:spLocks noGrp="1"/>
+          </p:cNvSpPr>
+          <p:nvPr>
+            <p:ph type="title"/>
+          </p:nvPr>
+        </p:nvSpPr>
+        <p:spPr/>
+        <p:txBody>
+          <a:bodyPr/>
+          <a:lstStyle/>
+          <a:p>
+            <a:r>
+              <a:rPr lang="ru-RU" dirty="0"/>
+              <a:t>Почему именно геймдев как хобби</a:t>
+            </a:r>
+            <a:endParaRPr lang="en-US" dirty="0"/>
+          </a:p>
+        </p:txBody>
+      </p:sp>
+      <p:sp>
+        <p:nvSpPr>
+          <p:cNvPr id="3" name="Content Placeholder 2">
+            <a:extLst>
+              <a:ext uri="{FF2B5EF4-FFF2-40B4-BE49-F238E27FC236}">
+                <a16:creationId xmlns:a16="http://schemas.microsoft.com/office/drawing/2014/main" id="{09B58E06-CAFA-40C4-BAD2-7BDDC71F20C0}"/>
+              </a:ext>
+            </a:extLst>
+          </p:cNvPr>
+          <p:cNvSpPr>
+            <a:spLocks noGrp="1"/>
+          </p:cNvSpPr>
+          <p:nvPr>
+            <p:ph idx="1"/>
+          </p:nvPr>
+        </p:nvSpPr>
+        <p:spPr/>
+        <p:txBody>
+          <a:bodyPr/>
+          <a:lstStyle/>
+          <a:p>
+            <a:r>
+              <a:rPr lang="ru-RU" dirty="0"/>
+              <a:t>Многие утилитарные вещи уже давно готовы</a:t>
+            </a:r>
+          </a:p>
+          <a:p>
+            <a:r>
+              <a:rPr lang="ru-RU" dirty="0"/>
+              <a:t>«Полезности» требуют серьездной разработки</a:t>
+            </a:r>
+          </a:p>
+          <a:p>
+            <a:r>
+              <a:rPr lang="ru-RU" dirty="0"/>
+              <a:t>Игры тоже, но прототипы нет</a:t>
+            </a:r>
+          </a:p>
+          <a:p>
+            <a:r>
+              <a:rPr lang="ru-RU" dirty="0"/>
+              <a:t>У вас наверняка есть масса идей нового игрового процесса или улучшения</a:t>
+            </a:r>
+          </a:p>
+          <a:p>
+            <a:r>
+              <a:rPr lang="ru-RU" b="1" dirty="0"/>
+              <a:t>Мы разрабатываем не игры, но прототипы игр</a:t>
+            </a:r>
+            <a:r>
+              <a:rPr lang="en-US" b="1" dirty="0"/>
+              <a:t> - </a:t>
+            </a:r>
+            <a:r>
+              <a:rPr lang="en-US" b="1" dirty="0" err="1"/>
+              <a:t>hobbygames</a:t>
+            </a:r>
+            <a:endParaRPr lang="en-US" b="1" dirty="0"/>
+          </a:p>
+        </p:txBody>
+      </p:sp>
+    </p:spTree>
+    <p:extLst>
+      <p:ext uri="{BB962C8B-B14F-4D97-AF65-F5344CB8AC3E}">
+        <p14:creationId xmlns:p14="http://schemas.microsoft.com/office/powerpoint/2010/main" val="764024716"/>
+      </p:ext>
+    </p:extLst>
+  </p:cSld>
+  <p:clrMapOvr>
+    <a:masterClrMapping/>
+  </p:clrMapOvr>
+</p:sld>
+</file>
+
+<file path=ppt/slides/slide15.xml><?xml version="1.0" encoding="utf-8"?>
+<p:sld xmlns:a="http://schemas.openxmlformats.org/drawingml/2006/main" xmlns:r="http://schemas.openxmlformats.org/officeDocument/2006/relationships" xmlns:p="http://schemas.openxmlformats.org/presentationml/2006/main">
+  <p:cSld>
+    <p:spTree>
+      <p:nvGrpSpPr>
+        <p:cNvPr id="1" name=""/>
+        <p:cNvGrpSpPr/>
+        <p:nvPr/>
+      </p:nvGrpSpPr>
+      <p:grpSpPr>
+        <a:xfrm>
+          <a:off x="0" y="0"/>
+          <a:ext cx="0" cy="0"/>
+          <a:chOff x="0" y="0"/>
+          <a:chExt cx="0" cy="0"/>
+        </a:xfrm>
+      </p:grpSpPr>
+      <p:sp>
+        <p:nvSpPr>
+          <p:cNvPr id="2" name="Title 1">
+            <a:extLst>
+              <a:ext uri="{FF2B5EF4-FFF2-40B4-BE49-F238E27FC236}">
                 <a16:creationId xmlns:a16="http://schemas.microsoft.com/office/drawing/2014/main" id="{B372053F-7018-4868-B46E-E967DA9108EF}"/>
               </a:ext>
             </a:extLst>
@@ -3885,7 +4565,9 @@
         </p:nvSpPr>
         <p:spPr/>
         <p:txBody>
-          <a:bodyPr/>
+          <a:bodyPr>
+            <a:normAutofit/>
+          </a:bodyPr>
           <a:lstStyle/>
           <a:p>
             <a:r>
@@ -3903,6 +4585,25 @@
             <a:r>
               <a:rPr lang="ru-RU" dirty="0"/>
               <a:t>Свобода – всегда можно прерваться</a:t>
+            </a:r>
+            <a:endParaRPr lang="en-US" dirty="0"/>
+          </a:p>
+          <a:p>
+            <a:r>
+              <a:rPr lang="ru-RU" dirty="0"/>
+              <a:t>Есть тема для обсуждения с единомышленниками</a:t>
+            </a:r>
+          </a:p>
+          <a:p>
+            <a:r>
+              <a:rPr lang="ru-RU" dirty="0"/>
+              <a:t>Делаешь именно то что хочешь, не ферму, а то что хочешь</a:t>
+            </a:r>
+          </a:p>
+          <a:p>
+            <a:r>
+              <a:rPr lang="ru-RU" dirty="0"/>
+              <a:t>Игра тоже задалбывает… и ты из нее можешь убежать в работу и обратно</a:t>
             </a:r>
           </a:p>
           <a:p>
@@ -3922,6 +4623,496 @@
     <p:extLst>
       <p:ext uri="{BB962C8B-B14F-4D97-AF65-F5344CB8AC3E}">
         <p14:creationId xmlns:p14="http://schemas.microsoft.com/office/powerpoint/2010/main" val="1451321503"/>
+      </p:ext>
+    </p:extLst>
+  </p:cSld>
+  <p:clrMapOvr>
+    <a:masterClrMapping/>
+  </p:clrMapOvr>
+</p:sld>
+</file>
+
+<file path=ppt/slides/slide16.xml><?xml version="1.0" encoding="utf-8"?>
+<p:sld xmlns:a="http://schemas.openxmlformats.org/drawingml/2006/main" xmlns:r="http://schemas.openxmlformats.org/officeDocument/2006/relationships" xmlns:p="http://schemas.openxmlformats.org/presentationml/2006/main">
+  <p:cSld>
+    <p:spTree>
+      <p:nvGrpSpPr>
+        <p:cNvPr id="1" name=""/>
+        <p:cNvGrpSpPr/>
+        <p:nvPr/>
+      </p:nvGrpSpPr>
+      <p:grpSpPr>
+        <a:xfrm>
+          <a:off x="0" y="0"/>
+          <a:ext cx="0" cy="0"/>
+          <a:chOff x="0" y="0"/>
+          <a:chExt cx="0" cy="0"/>
+        </a:xfrm>
+      </p:grpSpPr>
+      <p:sp>
+        <p:nvSpPr>
+          <p:cNvPr id="2" name="Title 1">
+            <a:extLst>
+              <a:ext uri="{FF2B5EF4-FFF2-40B4-BE49-F238E27FC236}">
+                <a16:creationId xmlns:a16="http://schemas.microsoft.com/office/drawing/2014/main" id="{3E7A1AA2-965B-4F0C-937A-64C498B9CC42}"/>
+              </a:ext>
+            </a:extLst>
+          </p:cNvPr>
+          <p:cNvSpPr>
+            <a:spLocks noGrp="1"/>
+          </p:cNvSpPr>
+          <p:nvPr>
+            <p:ph type="title"/>
+          </p:nvPr>
+        </p:nvSpPr>
+        <p:spPr/>
+        <p:txBody>
+          <a:bodyPr/>
+          <a:lstStyle/>
+          <a:p>
+            <a:r>
+              <a:rPr lang="ru-RU" dirty="0"/>
+              <a:t>А когда мне это надоест?</a:t>
+            </a:r>
+            <a:endParaRPr lang="en-US" dirty="0"/>
+          </a:p>
+        </p:txBody>
+      </p:sp>
+      <p:sp>
+        <p:nvSpPr>
+          <p:cNvPr id="3" name="Content Placeholder 2">
+            <a:extLst>
+              <a:ext uri="{FF2B5EF4-FFF2-40B4-BE49-F238E27FC236}">
+                <a16:creationId xmlns:a16="http://schemas.microsoft.com/office/drawing/2014/main" id="{DB488397-73E7-4910-91DC-DE7D9FE6AEAB}"/>
+              </a:ext>
+            </a:extLst>
+          </p:cNvPr>
+          <p:cNvSpPr>
+            <a:spLocks noGrp="1"/>
+          </p:cNvSpPr>
+          <p:nvPr>
+            <p:ph idx="1"/>
+          </p:nvPr>
+        </p:nvSpPr>
+        <p:spPr/>
+        <p:txBody>
+          <a:bodyPr/>
+          <a:lstStyle/>
+          <a:p>
+            <a:r>
+              <a:rPr lang="ru-RU" dirty="0"/>
+              <a:t>Когда надоедает хобби, работа получает второе дыхание</a:t>
+            </a:r>
+          </a:p>
+          <a:p>
+            <a:r>
+              <a:rPr lang="ru-RU" dirty="0"/>
+              <a:t>Правило 15 минут</a:t>
+            </a:r>
+          </a:p>
+          <a:p>
+            <a:r>
+              <a:rPr lang="ru-RU" dirty="0"/>
+              <a:t>Не бойтесь прерваться/остановиться</a:t>
+            </a:r>
+            <a:endParaRPr lang="en-US" dirty="0"/>
+          </a:p>
+        </p:txBody>
+      </p:sp>
+    </p:spTree>
+    <p:extLst>
+      <p:ext uri="{BB962C8B-B14F-4D97-AF65-F5344CB8AC3E}">
+        <p14:creationId xmlns:p14="http://schemas.microsoft.com/office/powerpoint/2010/main" val="2390622314"/>
+      </p:ext>
+    </p:extLst>
+  </p:cSld>
+  <p:clrMapOvr>
+    <a:masterClrMapping/>
+  </p:clrMapOvr>
+</p:sld>
+</file>
+
+<file path=ppt/slides/slide17.xml><?xml version="1.0" encoding="utf-8"?>
+<p:sld xmlns:a="http://schemas.openxmlformats.org/drawingml/2006/main" xmlns:r="http://schemas.openxmlformats.org/officeDocument/2006/relationships" xmlns:p="http://schemas.openxmlformats.org/presentationml/2006/main">
+  <p:cSld>
+    <p:spTree>
+      <p:nvGrpSpPr>
+        <p:cNvPr id="1" name=""/>
+        <p:cNvGrpSpPr/>
+        <p:nvPr/>
+      </p:nvGrpSpPr>
+      <p:grpSpPr>
+        <a:xfrm>
+          <a:off x="0" y="0"/>
+          <a:ext cx="0" cy="0"/>
+          <a:chOff x="0" y="0"/>
+          <a:chExt cx="0" cy="0"/>
+        </a:xfrm>
+      </p:grpSpPr>
+      <p:sp>
+        <p:nvSpPr>
+          <p:cNvPr id="2" name="Title 1">
+            <a:extLst>
+              <a:ext uri="{FF2B5EF4-FFF2-40B4-BE49-F238E27FC236}">
+                <a16:creationId xmlns:a16="http://schemas.microsoft.com/office/drawing/2014/main" id="{6D52073F-2C96-4EF8-BCBD-3BD3249B71D3}"/>
+              </a:ext>
+            </a:extLst>
+          </p:cNvPr>
+          <p:cNvSpPr>
+            <a:spLocks noGrp="1"/>
+          </p:cNvSpPr>
+          <p:nvPr>
+            <p:ph type="title"/>
+          </p:nvPr>
+        </p:nvSpPr>
+        <p:spPr/>
+        <p:txBody>
+          <a:bodyPr/>
+          <a:lstStyle/>
+          <a:p>
+            <a:r>
+              <a:rPr lang="ru-RU" dirty="0"/>
+              <a:t>Учимся прерываться</a:t>
+            </a:r>
+            <a:endParaRPr lang="en-US" dirty="0"/>
+          </a:p>
+        </p:txBody>
+      </p:sp>
+      <p:sp>
+        <p:nvSpPr>
+          <p:cNvPr id="3" name="Content Placeholder 2">
+            <a:extLst>
+              <a:ext uri="{FF2B5EF4-FFF2-40B4-BE49-F238E27FC236}">
+                <a16:creationId xmlns:a16="http://schemas.microsoft.com/office/drawing/2014/main" id="{EC727410-7AC0-4DCA-8136-93B027E22CE7}"/>
+              </a:ext>
+            </a:extLst>
+          </p:cNvPr>
+          <p:cNvSpPr>
+            <a:spLocks noGrp="1"/>
+          </p:cNvSpPr>
+          <p:nvPr>
+            <p:ph idx="1"/>
+          </p:nvPr>
+        </p:nvSpPr>
+        <p:spPr/>
+        <p:txBody>
+          <a:bodyPr/>
+          <a:lstStyle/>
+          <a:p>
+            <a:r>
+              <a:rPr lang="ru-RU" dirty="0"/>
+              <a:t>С детствая нам внушают доводить все до конца</a:t>
+            </a:r>
+          </a:p>
+          <a:p>
+            <a:r>
+              <a:rPr lang="ru-RU" dirty="0"/>
+              <a:t>Но если ты можешь прерваться ты свободен</a:t>
+            </a:r>
+          </a:p>
+          <a:p>
+            <a:r>
+              <a:rPr lang="ru-RU" dirty="0"/>
+              <a:t>Свободен выбирать любую идею, а не ту, которую возможно закончить</a:t>
+            </a:r>
+          </a:p>
+          <a:p>
+            <a:r>
+              <a:rPr lang="ru-RU" dirty="0"/>
+              <a:t>Прерываться стоит тогда, когда захочишь</a:t>
+            </a:r>
+          </a:p>
+          <a:p>
+            <a:r>
+              <a:rPr lang="ru-RU" dirty="0"/>
+              <a:t>Но заброшенная игра – не выброшенные ресурсы</a:t>
+            </a:r>
+          </a:p>
+          <a:p>
+            <a:r>
+              <a:rPr lang="ru-RU" dirty="0"/>
+              <a:t>Это опыт</a:t>
+            </a:r>
+            <a:endParaRPr lang="en-US" dirty="0"/>
+          </a:p>
+        </p:txBody>
+      </p:sp>
+    </p:spTree>
+    <p:extLst>
+      <p:ext uri="{BB962C8B-B14F-4D97-AF65-F5344CB8AC3E}">
+        <p14:creationId xmlns:p14="http://schemas.microsoft.com/office/powerpoint/2010/main" val="2216546390"/>
+      </p:ext>
+    </p:extLst>
+  </p:cSld>
+  <p:clrMapOvr>
+    <a:masterClrMapping/>
+  </p:clrMapOvr>
+</p:sld>
+</file>
+
+<file path=ppt/slides/slide18.xml><?xml version="1.0" encoding="utf-8"?>
+<p:sld xmlns:a="http://schemas.openxmlformats.org/drawingml/2006/main" xmlns:r="http://schemas.openxmlformats.org/officeDocument/2006/relationships" xmlns:p="http://schemas.openxmlformats.org/presentationml/2006/main">
+  <p:cSld>
+    <p:spTree>
+      <p:nvGrpSpPr>
+        <p:cNvPr id="1" name=""/>
+        <p:cNvGrpSpPr/>
+        <p:nvPr/>
+      </p:nvGrpSpPr>
+      <p:grpSpPr>
+        <a:xfrm>
+          <a:off x="0" y="0"/>
+          <a:ext cx="0" cy="0"/>
+          <a:chOff x="0" y="0"/>
+          <a:chExt cx="0" cy="0"/>
+        </a:xfrm>
+      </p:grpSpPr>
+      <p:sp>
+        <p:nvSpPr>
+          <p:cNvPr id="2" name="Title 1">
+            <a:extLst>
+              <a:ext uri="{FF2B5EF4-FFF2-40B4-BE49-F238E27FC236}">
+                <a16:creationId xmlns:a16="http://schemas.microsoft.com/office/drawing/2014/main" id="{7D7AF104-BD2D-4BB0-97B8-50507C9794B3}"/>
+              </a:ext>
+            </a:extLst>
+          </p:cNvPr>
+          <p:cNvSpPr>
+            <a:spLocks noGrp="1"/>
+          </p:cNvSpPr>
+          <p:nvPr>
+            <p:ph type="title"/>
+          </p:nvPr>
+        </p:nvSpPr>
+        <p:spPr/>
+        <p:txBody>
+          <a:bodyPr/>
+          <a:lstStyle/>
+          <a:p>
+            <a:r>
+              <a:rPr lang="ru-RU" dirty="0"/>
+              <a:t>Прекращенные </a:t>
+            </a:r>
+            <a:r>
+              <a:rPr lang="en-US" dirty="0"/>
+              <a:t>&lt;&gt; </a:t>
+            </a:r>
+            <a:r>
+              <a:rPr lang="ru-RU" dirty="0"/>
+              <a:t>бесполезный</a:t>
+            </a:r>
+            <a:endParaRPr lang="en-US" dirty="0"/>
+          </a:p>
+        </p:txBody>
+      </p:sp>
+      <p:sp>
+        <p:nvSpPr>
+          <p:cNvPr id="3" name="Content Placeholder 2">
+            <a:extLst>
+              <a:ext uri="{FF2B5EF4-FFF2-40B4-BE49-F238E27FC236}">
+                <a16:creationId xmlns:a16="http://schemas.microsoft.com/office/drawing/2014/main" id="{5FE74363-175B-491B-9371-12E330E7A72D}"/>
+              </a:ext>
+            </a:extLst>
+          </p:cNvPr>
+          <p:cNvSpPr>
+            <a:spLocks noGrp="1"/>
+          </p:cNvSpPr>
+          <p:nvPr>
+            <p:ph idx="1"/>
+          </p:nvPr>
+        </p:nvSpPr>
+        <p:spPr/>
+        <p:txBody>
+          <a:bodyPr/>
+          <a:lstStyle/>
+          <a:p>
+            <a:r>
+              <a:rPr lang="ru-RU" dirty="0"/>
+              <a:t>Опыт в программировании</a:t>
+            </a:r>
+          </a:p>
+          <a:p>
+            <a:r>
+              <a:rPr lang="ru-RU" dirty="0"/>
+              <a:t>Понимание игровой фишки</a:t>
+            </a:r>
+          </a:p>
+          <a:p>
+            <a:r>
+              <a:rPr lang="ru-RU" dirty="0"/>
+              <a:t>Паттерн/готовое решение</a:t>
+            </a:r>
+          </a:p>
+          <a:p>
+            <a:r>
+              <a:rPr lang="ru-RU" dirty="0"/>
+              <a:t>Опыт работы с каким либо подходом </a:t>
+            </a:r>
+            <a:r>
+              <a:rPr lang="en-US" dirty="0"/>
+              <a:t>(</a:t>
+            </a:r>
+            <a:r>
+              <a:rPr lang="en-US" dirty="0" err="1"/>
+              <a:t>rx</a:t>
+            </a:r>
+            <a:r>
+              <a:rPr lang="en-US" dirty="0"/>
+              <a:t>, actors, </a:t>
+            </a:r>
+            <a:r>
+              <a:rPr lang="en-US" dirty="0" err="1"/>
+              <a:t>fp</a:t>
+            </a:r>
+            <a:r>
+              <a:rPr lang="en-US" dirty="0"/>
+              <a:t>)</a:t>
+            </a:r>
+            <a:endParaRPr lang="ru-RU" dirty="0"/>
+          </a:p>
+          <a:p>
+            <a:r>
+              <a:rPr lang="ru-RU" dirty="0"/>
+              <a:t>Подарок друзьям (</a:t>
+            </a:r>
+            <a:r>
+              <a:rPr lang="en-US" dirty="0"/>
+              <a:t>AR)</a:t>
+            </a:r>
+            <a:endParaRPr lang="ru-RU" dirty="0"/>
+          </a:p>
+          <a:p>
+            <a:r>
+              <a:rPr lang="ru-RU" dirty="0"/>
+              <a:t>Учимся декомпозиции задачи</a:t>
+            </a:r>
+          </a:p>
+          <a:p>
+            <a:r>
+              <a:rPr lang="ru-RU" dirty="0"/>
+              <a:t>Математика(!)</a:t>
+            </a:r>
+            <a:endParaRPr lang="en-US" dirty="0"/>
+          </a:p>
+        </p:txBody>
+      </p:sp>
+    </p:spTree>
+    <p:extLst>
+      <p:ext uri="{BB962C8B-B14F-4D97-AF65-F5344CB8AC3E}">
+        <p14:creationId xmlns:p14="http://schemas.microsoft.com/office/powerpoint/2010/main" val="3572331163"/>
+      </p:ext>
+    </p:extLst>
+  </p:cSld>
+  <p:clrMapOvr>
+    <a:masterClrMapping/>
+  </p:clrMapOvr>
+</p:sld>
+</file>
+
+<file path=ppt/slides/slide19.xml><?xml version="1.0" encoding="utf-8"?>
+<p:sld xmlns:a="http://schemas.openxmlformats.org/drawingml/2006/main" xmlns:r="http://schemas.openxmlformats.org/officeDocument/2006/relationships" xmlns:p="http://schemas.openxmlformats.org/presentationml/2006/main">
+  <p:cSld>
+    <p:spTree>
+      <p:nvGrpSpPr>
+        <p:cNvPr id="1" name=""/>
+        <p:cNvGrpSpPr/>
+        <p:nvPr/>
+      </p:nvGrpSpPr>
+      <p:grpSpPr>
+        <a:xfrm>
+          <a:off x="0" y="0"/>
+          <a:ext cx="0" cy="0"/>
+          <a:chOff x="0" y="0"/>
+          <a:chExt cx="0" cy="0"/>
+        </a:xfrm>
+      </p:grpSpPr>
+      <p:sp>
+        <p:nvSpPr>
+          <p:cNvPr id="2" name="Title 1">
+            <a:extLst>
+              <a:ext uri="{FF2B5EF4-FFF2-40B4-BE49-F238E27FC236}">
+                <a16:creationId xmlns:a16="http://schemas.microsoft.com/office/drawing/2014/main" id="{41C42607-A798-406F-808C-ACB23633E238}"/>
+              </a:ext>
+            </a:extLst>
+          </p:cNvPr>
+          <p:cNvSpPr>
+            <a:spLocks noGrp="1"/>
+          </p:cNvSpPr>
+          <p:nvPr>
+            <p:ph type="title"/>
+          </p:nvPr>
+        </p:nvSpPr>
+        <p:spPr/>
+        <p:txBody>
+          <a:bodyPr/>
+          <a:lstStyle/>
+          <a:p>
+            <a:r>
+              <a:rPr lang="ru-RU" dirty="0"/>
+              <a:t>Как выбрать что создавать</a:t>
+            </a:r>
+            <a:endParaRPr lang="en-US" dirty="0"/>
+          </a:p>
+        </p:txBody>
+      </p:sp>
+      <p:sp>
+        <p:nvSpPr>
+          <p:cNvPr id="3" name="Content Placeholder 2">
+            <a:extLst>
+              <a:ext uri="{FF2B5EF4-FFF2-40B4-BE49-F238E27FC236}">
+                <a16:creationId xmlns:a16="http://schemas.microsoft.com/office/drawing/2014/main" id="{7EB360DE-DDE1-4641-B385-9258C0E71676}"/>
+              </a:ext>
+            </a:extLst>
+          </p:cNvPr>
+          <p:cNvSpPr>
+            <a:spLocks noGrp="1"/>
+          </p:cNvSpPr>
+          <p:nvPr>
+            <p:ph idx="1"/>
+          </p:nvPr>
+        </p:nvSpPr>
+        <p:spPr/>
+        <p:txBody>
+          <a:bodyPr/>
+          <a:lstStyle/>
+          <a:p>
+            <a:r>
+              <a:rPr lang="ru-RU" dirty="0"/>
+              <a:t>Свою идею, какой бы глобальной она ни была</a:t>
+            </a:r>
+          </a:p>
+          <a:p>
+            <a:r>
+              <a:rPr lang="ru-RU" dirty="0"/>
+              <a:t>«Классическую» игру с «улучшением» (</a:t>
+            </a:r>
+            <a:r>
+              <a:rPr lang="en-US" dirty="0" err="1"/>
+              <a:t>pac</a:t>
+            </a:r>
+            <a:r>
+              <a:rPr lang="en-US" dirty="0"/>
+              <a:t> man </a:t>
+            </a:r>
+            <a:r>
+              <a:rPr lang="ru-RU" dirty="0"/>
+              <a:t>с прокачкой)</a:t>
+            </a:r>
+          </a:p>
+          <a:p>
+            <a:r>
+              <a:rPr lang="ru-RU" dirty="0"/>
+              <a:t>Не пытайтесь думать «на перспективу»</a:t>
+            </a:r>
+          </a:p>
+          <a:p>
+            <a:endParaRPr lang="en-US" dirty="0"/>
+          </a:p>
+        </p:txBody>
+      </p:sp>
+    </p:spTree>
+    <p:extLst>
+      <p:ext uri="{BB962C8B-B14F-4D97-AF65-F5344CB8AC3E}">
+        <p14:creationId xmlns:p14="http://schemas.microsoft.com/office/powerpoint/2010/main" val="3916632639"/>
       </p:ext>
     </p:extLst>
   </p:cSld>
@@ -4010,6 +5201,272 @@
     <p:extLst>
       <p:ext uri="{BB962C8B-B14F-4D97-AF65-F5344CB8AC3E}">
         <p14:creationId xmlns:p14="http://schemas.microsoft.com/office/powerpoint/2010/main" val="2785802389"/>
+      </p:ext>
+    </p:extLst>
+  </p:cSld>
+  <p:clrMapOvr>
+    <a:masterClrMapping/>
+  </p:clrMapOvr>
+</p:sld>
+</file>
+
+<file path=ppt/slides/slide20.xml><?xml version="1.0" encoding="utf-8"?>
+<p:sld xmlns:a="http://schemas.openxmlformats.org/drawingml/2006/main" xmlns:r="http://schemas.openxmlformats.org/officeDocument/2006/relationships" xmlns:p="http://schemas.openxmlformats.org/presentationml/2006/main">
+  <p:cSld>
+    <p:spTree>
+      <p:nvGrpSpPr>
+        <p:cNvPr id="1" name=""/>
+        <p:cNvGrpSpPr/>
+        <p:nvPr/>
+      </p:nvGrpSpPr>
+      <p:grpSpPr>
+        <a:xfrm>
+          <a:off x="0" y="0"/>
+          <a:ext cx="0" cy="0"/>
+          <a:chOff x="0" y="0"/>
+          <a:chExt cx="0" cy="0"/>
+        </a:xfrm>
+      </p:grpSpPr>
+      <p:sp>
+        <p:nvSpPr>
+          <p:cNvPr id="2" name="Title 1">
+            <a:extLst>
+              <a:ext uri="{FF2B5EF4-FFF2-40B4-BE49-F238E27FC236}">
+                <a16:creationId xmlns:a16="http://schemas.microsoft.com/office/drawing/2014/main" id="{BE400DDD-5C81-49AF-B50D-832030EA2C74}"/>
+              </a:ext>
+            </a:extLst>
+          </p:cNvPr>
+          <p:cNvSpPr>
+            <a:spLocks noGrp="1"/>
+          </p:cNvSpPr>
+          <p:nvPr>
+            <p:ph type="title"/>
+          </p:nvPr>
+        </p:nvSpPr>
+        <p:spPr/>
+        <p:txBody>
+          <a:bodyPr/>
+          <a:lstStyle/>
+          <a:p>
+            <a:r>
+              <a:rPr lang="ru-RU" dirty="0"/>
+              <a:t>Ошибки</a:t>
+            </a:r>
+            <a:endParaRPr lang="en-US" dirty="0"/>
+          </a:p>
+        </p:txBody>
+      </p:sp>
+      <p:sp>
+        <p:nvSpPr>
+          <p:cNvPr id="3" name="Content Placeholder 2">
+            <a:extLst>
+              <a:ext uri="{FF2B5EF4-FFF2-40B4-BE49-F238E27FC236}">
+                <a16:creationId xmlns:a16="http://schemas.microsoft.com/office/drawing/2014/main" id="{30B00713-170B-46DF-8193-3CD4EB60C277}"/>
+              </a:ext>
+            </a:extLst>
+          </p:cNvPr>
+          <p:cNvSpPr>
+            <a:spLocks noGrp="1"/>
+          </p:cNvSpPr>
+          <p:nvPr>
+            <p:ph idx="1"/>
+          </p:nvPr>
+        </p:nvSpPr>
+        <p:spPr/>
+        <p:txBody>
+          <a:bodyPr/>
+          <a:lstStyle/>
+          <a:p>
+            <a:r>
+              <a:rPr lang="ru-RU" dirty="0"/>
+              <a:t>Целестремленность = выгорание</a:t>
+            </a:r>
+          </a:p>
+          <a:p>
+            <a:r>
+              <a:rPr lang="ru-RU" dirty="0"/>
+              <a:t>Рассказывать о своей игре всем вокруг = коммитишся на то что сделаешь</a:t>
+            </a:r>
+          </a:p>
+          <a:p>
+            <a:r>
+              <a:rPr lang="ru-RU" dirty="0"/>
+              <a:t>Попытки сделать "продающуюся игру"</a:t>
+            </a:r>
+          </a:p>
+          <a:p>
+            <a:r>
+              <a:rPr lang="ru-RU" dirty="0"/>
+              <a:t>Собирать команду</a:t>
+            </a:r>
+          </a:p>
+          <a:p>
+            <a:pPr lvl="1"/>
+            <a:r>
+              <a:rPr lang="ru-RU" dirty="0"/>
+              <a:t>Показать ассеты</a:t>
+            </a:r>
+            <a:endParaRPr lang="en-US" dirty="0"/>
+          </a:p>
+        </p:txBody>
+      </p:sp>
+    </p:spTree>
+    <p:extLst>
+      <p:ext uri="{BB962C8B-B14F-4D97-AF65-F5344CB8AC3E}">
+        <p14:creationId xmlns:p14="http://schemas.microsoft.com/office/powerpoint/2010/main" val="1860011924"/>
+      </p:ext>
+    </p:extLst>
+  </p:cSld>
+  <p:clrMapOvr>
+    <a:masterClrMapping/>
+  </p:clrMapOvr>
+</p:sld>
+</file>
+
+<file path=ppt/slides/slide21.xml><?xml version="1.0" encoding="utf-8"?>
+<p:sld xmlns:a="http://schemas.openxmlformats.org/drawingml/2006/main" xmlns:r="http://schemas.openxmlformats.org/officeDocument/2006/relationships" xmlns:p="http://schemas.openxmlformats.org/presentationml/2006/main">
+  <p:cSld>
+    <p:spTree>
+      <p:nvGrpSpPr>
+        <p:cNvPr id="1" name=""/>
+        <p:cNvGrpSpPr/>
+        <p:nvPr/>
+      </p:nvGrpSpPr>
+      <p:grpSpPr>
+        <a:xfrm>
+          <a:off x="0" y="0"/>
+          <a:ext cx="0" cy="0"/>
+          <a:chOff x="0" y="0"/>
+          <a:chExt cx="0" cy="0"/>
+        </a:xfrm>
+      </p:grpSpPr>
+      <p:sp>
+        <p:nvSpPr>
+          <p:cNvPr id="2" name="Title 1">
+            <a:extLst>
+              <a:ext uri="{FF2B5EF4-FFF2-40B4-BE49-F238E27FC236}">
+                <a16:creationId xmlns:a16="http://schemas.microsoft.com/office/drawing/2014/main" id="{871D3BEF-CBC5-41C5-A3C0-45CFE2F0AE39}"/>
+              </a:ext>
+            </a:extLst>
+          </p:cNvPr>
+          <p:cNvSpPr>
+            <a:spLocks noGrp="1"/>
+          </p:cNvSpPr>
+          <p:nvPr>
+            <p:ph type="title"/>
+          </p:nvPr>
+        </p:nvSpPr>
+        <p:spPr/>
+        <p:txBody>
+          <a:bodyPr/>
+          <a:lstStyle/>
+          <a:p>
+            <a:r>
+              <a:rPr lang="ru-RU" dirty="0"/>
+              <a:t>Что нужно для</a:t>
+            </a:r>
+            <a:r>
+              <a:rPr lang="en-US" dirty="0"/>
+              <a:t> </a:t>
+            </a:r>
+            <a:r>
+              <a:rPr lang="en-US" dirty="0" err="1"/>
+              <a:t>hobbygame</a:t>
+            </a:r>
+            <a:r>
+              <a:rPr lang="ru-RU" dirty="0"/>
+              <a:t>?</a:t>
+            </a:r>
+            <a:endParaRPr lang="en-US" dirty="0"/>
+          </a:p>
+        </p:txBody>
+      </p:sp>
+      <p:sp>
+        <p:nvSpPr>
+          <p:cNvPr id="3" name="Content Placeholder 2">
+            <a:extLst>
+              <a:ext uri="{FF2B5EF4-FFF2-40B4-BE49-F238E27FC236}">
+                <a16:creationId xmlns:a16="http://schemas.microsoft.com/office/drawing/2014/main" id="{D5D99C64-48E7-470C-A43F-5BA87DE95F80}"/>
+              </a:ext>
+            </a:extLst>
+          </p:cNvPr>
+          <p:cNvSpPr>
+            <a:spLocks noGrp="1"/>
+          </p:cNvSpPr>
+          <p:nvPr>
+            <p:ph idx="1"/>
+          </p:nvPr>
+        </p:nvSpPr>
+        <p:spPr/>
+        <p:txBody>
+          <a:bodyPr/>
+          <a:lstStyle/>
+          <a:p>
+            <a:r>
+              <a:rPr lang="ru-RU" dirty="0"/>
+              <a:t>Графика: </a:t>
+            </a:r>
+            <a:r>
+              <a:rPr lang="en-US" dirty="0"/>
+              <a:t>TBD </a:t>
+            </a:r>
+            <a:r>
+              <a:rPr lang="ru-RU" dirty="0"/>
+              <a:t>ссылки на </a:t>
+            </a:r>
+            <a:r>
+              <a:rPr lang="en-US" dirty="0"/>
+              <a:t>assets</a:t>
+            </a:r>
+          </a:p>
+          <a:p>
+            <a:r>
+              <a:rPr lang="ru-RU" dirty="0"/>
+              <a:t>Звук: </a:t>
+            </a:r>
+            <a:r>
+              <a:rPr lang="en-US" dirty="0"/>
+              <a:t>TBD </a:t>
+            </a:r>
+            <a:r>
+              <a:rPr lang="ru-RU" dirty="0"/>
+              <a:t>ссылки на то, откуда взял музыку для подкаста</a:t>
+            </a:r>
+          </a:p>
+          <a:p>
+            <a:r>
+              <a:rPr lang="ru-RU" dirty="0"/>
+              <a:t>Геймплей: это вы</a:t>
+            </a:r>
+          </a:p>
+          <a:p>
+            <a:r>
+              <a:rPr lang="ru-RU" dirty="0"/>
+              <a:t>Левел дизайн: </a:t>
+            </a:r>
+            <a:r>
+              <a:rPr lang="en-US" dirty="0" err="1"/>
+              <a:t>greybox</a:t>
+            </a:r>
+            <a:endParaRPr lang="en-US" dirty="0"/>
+          </a:p>
+          <a:p>
+            <a:r>
+              <a:rPr lang="en-US" dirty="0"/>
+              <a:t>UX – </a:t>
+            </a:r>
+            <a:r>
+              <a:rPr lang="ru-RU"/>
+              <a:t>ну не обязательно</a:t>
+            </a:r>
+            <a:endParaRPr lang="en-US" dirty="0"/>
+          </a:p>
+        </p:txBody>
+      </p:sp>
+    </p:spTree>
+    <p:extLst>
+      <p:ext uri="{BB962C8B-B14F-4D97-AF65-F5344CB8AC3E}">
+        <p14:creationId xmlns:p14="http://schemas.microsoft.com/office/powerpoint/2010/main" val="1030091341"/>
       </p:ext>
     </p:extLst>
   </p:cSld>
@@ -5218,4 +6675,299 @@
     </a:ext>
   </a:extLst>
 </a:theme>
+</file>
+
+<file path=ppt/theme/theme2.xml><?xml version="1.0" encoding="utf-8"?>
+<a:theme xmlns:a="http://schemas.openxmlformats.org/drawingml/2006/main" name="Office Theme">
+  <a:themeElements>
+    <a:clrScheme name="Office">
+      <a:dk1>
+        <a:sysClr val="windowText" lastClr="000000"/>
+      </a:dk1>
+      <a:lt1>
+        <a:sysClr val="window" lastClr="FFFFFF"/>
+      </a:lt1>
+      <a:dk2>
+        <a:srgbClr val="44546A"/>
+      </a:dk2>
+      <a:lt2>
+        <a:srgbClr val="E7E6E6"/>
+      </a:lt2>
+      <a:accent1>
+        <a:srgbClr val="4472C4"/>
+      </a:accent1>
+      <a:accent2>
+        <a:srgbClr val="ED7D31"/>
+      </a:accent2>
+      <a:accent3>
+        <a:srgbClr val="A5A5A5"/>
+      </a:accent3>
+      <a:accent4>
+        <a:srgbClr val="FFC000"/>
+      </a:accent4>
+      <a:accent5>
+        <a:srgbClr val="5B9BD5"/>
+      </a:accent5>
+      <a:accent6>
+        <a:srgbClr val="70AD47"/>
+      </a:accent6>
+      <a:hlink>
+        <a:srgbClr val="0563C1"/>
+      </a:hlink>
+      <a:folHlink>
+        <a:srgbClr val="954F72"/>
+      </a:folHlink>
+    </a:clrScheme>
+    <a:fontScheme name="Office">
+      <a:majorFont>
+        <a:latin typeface="Calibri Light" panose="020F0302020204030204"/>
+        <a:ea typeface=""/>
+        <a:cs typeface=""/>
+        <a:font script="Jpan" typeface="游ゴシック Light"/>
+        <a:font script="Hang" typeface="맑은 고딕"/>
+        <a:font script="Hans" typeface="等线 Light"/>
+        <a:font script="Hant" typeface="新細明體"/>
+        <a:font script="Arab" typeface="Times New Roman"/>
+        <a:font script="Hebr" typeface="Times New Roman"/>
+        <a:font script="Thai" typeface="Angsana New"/>
+        <a:font script="Ethi" typeface="Nyala"/>
+        <a:font script="Beng" typeface="Vrinda"/>
+        <a:font script="Gujr" typeface="Shruti"/>
+        <a:font script="Khmr" typeface="MoolBoran"/>
+        <a:font script="Knda" typeface="Tunga"/>
+        <a:font script="Guru" typeface="Raavi"/>
+        <a:font script="Cans" typeface="Euphemia"/>
+        <a:font script="Cher" typeface="Plantagenet Cherokee"/>
+        <a:font script="Yiii" typeface="Microsoft Yi Baiti"/>
+        <a:font script="Tibt" typeface="Microsoft Himalaya"/>
+        <a:font script="Thaa" typeface="MV Boli"/>
+        <a:font script="Deva" typeface="Mangal"/>
+        <a:font script="Telu" typeface="Gautami"/>
+        <a:font script="Taml" typeface="Latha"/>
+        <a:font script="Syrc" typeface="Estrangelo Edessa"/>
+        <a:font script="Orya" typeface="Kalinga"/>
+        <a:font script="Mlym" typeface="Kartika"/>
+        <a:font script="Laoo" typeface="DokChampa"/>
+        <a:font script="Sinh" typeface="Iskoola Pota"/>
+        <a:font script="Mong" typeface="Mongolian Baiti"/>
+        <a:font script="Viet" typeface="Times New Roman"/>
+        <a:font script="Uigh" typeface="Microsoft Uighur"/>
+        <a:font script="Geor" typeface="Sylfaen"/>
+        <a:font script="Armn" typeface="Arial"/>
+        <a:font script="Bugi" typeface="Leelawadee UI"/>
+        <a:font script="Bopo" typeface="Microsoft JhengHei"/>
+        <a:font script="Java" typeface="Javanese Text"/>
+        <a:font script="Lisu" typeface="Segoe UI"/>
+        <a:font script="Mymr" typeface="Myanmar Text"/>
+        <a:font script="Nkoo" typeface="Ebrima"/>
+        <a:font script="Olck" typeface="Nirmala UI"/>
+        <a:font script="Osma" typeface="Ebrima"/>
+        <a:font script="Phag" typeface="Phagspa"/>
+        <a:font script="Syrn" typeface="Estrangelo Edessa"/>
+        <a:font script="Syrj" typeface="Estrangelo Edessa"/>
+        <a:font script="Syre" typeface="Estrangelo Edessa"/>
+        <a:font script="Sora" typeface="Nirmala UI"/>
+        <a:font script="Tale" typeface="Microsoft Tai Le"/>
+        <a:font script="Talu" typeface="Microsoft New Tai Lue"/>
+        <a:font script="Tfng" typeface="Ebrima"/>
+      </a:majorFont>
+      <a:minorFont>
+        <a:latin typeface="Calibri" panose="020F0502020204030204"/>
+        <a:ea typeface=""/>
+        <a:cs typeface=""/>
+        <a:font script="Jpan" typeface="游ゴシック"/>
+        <a:font script="Hang" typeface="맑은 고딕"/>
+        <a:font script="Hans" typeface="等线"/>
+        <a:font script="Hant" typeface="新細明體"/>
+        <a:font script="Arab" typeface="Arial"/>
+        <a:font script="Hebr" typeface="Arial"/>
+        <a:font script="Thai" typeface="Cordia New"/>
+        <a:font script="Ethi" typeface="Nyala"/>
+        <a:font script="Beng" typeface="Vrinda"/>
+        <a:font script="Gujr" typeface="Shruti"/>
+        <a:font script="Khmr" typeface="DaunPenh"/>
+        <a:font script="Knda" typeface="Tunga"/>
+        <a:font script="Guru" typeface="Raavi"/>
+        <a:font script="Cans" typeface="Euphemia"/>
+        <a:font script="Cher" typeface="Plantagenet Cherokee"/>
+        <a:font script="Yiii" typeface="Microsoft Yi Baiti"/>
+        <a:font script="Tibt" typeface="Microsoft Himalaya"/>
+        <a:font script="Thaa" typeface="MV Boli"/>
+        <a:font script="Deva" typeface="Mangal"/>
+        <a:font script="Telu" typeface="Gautami"/>
+        <a:font script="Taml" typeface="Latha"/>
+        <a:font script="Syrc" typeface="Estrangelo Edessa"/>
+        <a:font script="Orya" typeface="Kalinga"/>
+        <a:font script="Mlym" typeface="Kartika"/>
+        <a:font script="Laoo" typeface="DokChampa"/>
+        <a:font script="Sinh" typeface="Iskoola Pota"/>
+        <a:font script="Mong" typeface="Mongolian Baiti"/>
+        <a:font script="Viet" typeface="Arial"/>
+        <a:font script="Uigh" typeface="Microsoft Uighur"/>
+        <a:font script="Geor" typeface="Sylfaen"/>
+        <a:font script="Armn" typeface="Arial"/>
+        <a:font script="Bugi" typeface="Leelawadee UI"/>
+        <a:font script="Bopo" typeface="Microsoft JhengHei"/>
+        <a:font script="Java" typeface="Javanese Text"/>
+        <a:font script="Lisu" typeface="Segoe UI"/>
+        <a:font script="Mymr" typeface="Myanmar Text"/>
+        <a:font script="Nkoo" typeface="Ebrima"/>
+        <a:font script="Olck" typeface="Nirmala UI"/>
+        <a:font script="Osma" typeface="Ebrima"/>
+        <a:font script="Phag" typeface="Phagspa"/>
+        <a:font script="Syrn" typeface="Estrangelo Edessa"/>
+        <a:font script="Syrj" typeface="Estrangelo Edessa"/>
+        <a:font script="Syre" typeface="Estrangelo Edessa"/>
+        <a:font script="Sora" typeface="Nirmala UI"/>
+        <a:font script="Tale" typeface="Microsoft Tai Le"/>
+        <a:font script="Talu" typeface="Microsoft New Tai Lue"/>
+        <a:font script="Tfng" typeface="Ebrima"/>
+      </a:minorFont>
+    </a:fontScheme>
+    <a:fmtScheme name="Office">
+      <a:fillStyleLst>
+        <a:solidFill>
+          <a:schemeClr val="phClr"/>
+        </a:solidFill>
+        <a:gradFill rotWithShape="1">
+          <a:gsLst>
+            <a:gs pos="0">
+              <a:schemeClr val="phClr">
+                <a:lumMod val="110000"/>
+                <a:satMod val="105000"/>
+                <a:tint val="67000"/>
+              </a:schemeClr>
+            </a:gs>
+            <a:gs pos="50000">
+              <a:schemeClr val="phClr">
+                <a:lumMod val="105000"/>
+                <a:satMod val="103000"/>
+                <a:tint val="73000"/>
+              </a:schemeClr>
+            </a:gs>
+            <a:gs pos="100000">
+              <a:schemeClr val="phClr">
+                <a:lumMod val="105000"/>
+                <a:satMod val="109000"/>
+                <a:tint val="81000"/>
+              </a:schemeClr>
+            </a:gs>
+          </a:gsLst>
+          <a:lin ang="5400000" scaled="0"/>
+        </a:gradFill>
+        <a:gradFill rotWithShape="1">
+          <a:gsLst>
+            <a:gs pos="0">
+              <a:schemeClr val="phClr">
+                <a:satMod val="103000"/>
+                <a:lumMod val="102000"/>
+                <a:tint val="94000"/>
+              </a:schemeClr>
+            </a:gs>
+            <a:gs pos="50000">
+              <a:schemeClr val="phClr">
+                <a:satMod val="110000"/>
+                <a:lumMod val="100000"/>
+                <a:shade val="100000"/>
+              </a:schemeClr>
+            </a:gs>
+            <a:gs pos="100000">
+              <a:schemeClr val="phClr">
+                <a:lumMod val="99000"/>
+                <a:satMod val="120000"/>
+                <a:shade val="78000"/>
+              </a:schemeClr>
+            </a:gs>
+          </a:gsLst>
+          <a:lin ang="5400000" scaled="0"/>
+        </a:gradFill>
+      </a:fillStyleLst>
+      <a:lnStyleLst>
+        <a:ln w="6350" cap="flat" cmpd="sng" algn="ctr">
+          <a:solidFill>
+            <a:schemeClr val="phClr"/>
+          </a:solidFill>
+          <a:prstDash val="solid"/>
+          <a:miter lim="800000"/>
+        </a:ln>
+        <a:ln w="12700" cap="flat" cmpd="sng" algn="ctr">
+          <a:solidFill>
+            <a:schemeClr val="phClr"/>
+          </a:solidFill>
+          <a:prstDash val="solid"/>
+          <a:miter lim="800000"/>
+        </a:ln>
+        <a:ln w="19050" cap="flat" cmpd="sng" algn="ctr">
+          <a:solidFill>
+            <a:schemeClr val="phClr"/>
+          </a:solidFill>
+          <a:prstDash val="solid"/>
+          <a:miter lim="800000"/>
+        </a:ln>
+      </a:lnStyleLst>
+      <a:effectStyleLst>
+        <a:effectStyle>
+          <a:effectLst/>
+        </a:effectStyle>
+        <a:effectStyle>
+          <a:effectLst/>
+        </a:effectStyle>
+        <a:effectStyle>
+          <a:effectLst>
+            <a:outerShdw blurRad="57150" dist="19050" dir="5400000" algn="ctr" rotWithShape="0">
+              <a:srgbClr val="000000">
+                <a:alpha val="63000"/>
+              </a:srgbClr>
+            </a:outerShdw>
+          </a:effectLst>
+        </a:effectStyle>
+      </a:effectStyleLst>
+      <a:bgFillStyleLst>
+        <a:solidFill>
+          <a:schemeClr val="phClr"/>
+        </a:solidFill>
+        <a:solidFill>
+          <a:schemeClr val="phClr">
+            <a:tint val="95000"/>
+            <a:satMod val="170000"/>
+          </a:schemeClr>
+        </a:solidFill>
+        <a:gradFill rotWithShape="1">
+          <a:gsLst>
+            <a:gs pos="0">
+              <a:schemeClr val="phClr">
+                <a:tint val="93000"/>
+                <a:satMod val="150000"/>
+                <a:shade val="98000"/>
+                <a:lumMod val="102000"/>
+              </a:schemeClr>
+            </a:gs>
+            <a:gs pos="50000">
+              <a:schemeClr val="phClr">
+                <a:tint val="98000"/>
+                <a:satMod val="130000"/>
+                <a:shade val="90000"/>
+                <a:lumMod val="103000"/>
+              </a:schemeClr>
+            </a:gs>
+            <a:gs pos="100000">
+              <a:schemeClr val="phClr">
+                <a:shade val="63000"/>
+                <a:satMod val="120000"/>
+              </a:schemeClr>
+            </a:gs>
+          </a:gsLst>
+          <a:lin ang="5400000" scaled="0"/>
+        </a:gradFill>
+      </a:bgFillStyleLst>
+    </a:fmtScheme>
+  </a:themeElements>
+  <a:objectDefaults/>
+  <a:extraClrSchemeLst/>
+  <a:extLst>
+    <a:ext uri="{05A4C25C-085E-4340-85A3-A5531E510DB2}">
+      <thm15:themeFamily xmlns:thm15="http://schemas.microsoft.com/office/thememl/2012/main" name="Office Theme" id="{62F939B6-93AF-4DB8-9C6B-D6C7DFDC589F}" vid="{4A3C46E8-61CC-4603-A589-7422A47A8E4A}"/>
+    </a:ext>
+  </a:extLst>
+</a:theme>
 </file>
</xml_diff>